<commit_message>
Added till day 4
Today Cryptography Covered
</commit_message>
<xml_diff>
--- a/CIA Triad Case Study.pptx
+++ b/CIA Triad Case Study.pptx
@@ -4456,7 +4456,7 @@
         <p:spPr>
           <a:xfrm>
             <a:off x="4898571" y="3153748"/>
-            <a:ext cx="6410131" cy="2585323"/>
+            <a:ext cx="6410131" cy="3416320"/>
           </a:xfrm>
           <a:prstGeom prst="rect">
             <a:avLst/>
@@ -4468,6 +4468,18 @@
             <a:spAutoFit/>
           </a:bodyPr>
           <a:lstStyle/>
+          <a:p>
+            <a:endParaRPr lang="en-US" sz="2700" b="0" i="0" dirty="0">
+              <a:solidFill>
+                <a:schemeClr val="tx1">
+                  <a:lumMod val="85000"/>
+                  <a:lumOff val="15000"/>
+                </a:schemeClr>
+              </a:solidFill>
+              <a:effectLst/>
+              <a:latin typeface="Eras Medium ITC" panose="020B0602030504020804" pitchFamily="34" charset="0"/>
+            </a:endParaRPr>
+          </a:p>
           <a:p>
             <a:r>
               <a:rPr lang="en-US" sz="2700" b="0" i="0" dirty="0">
@@ -4480,7 +4492,70 @@
                 <a:effectLst/>
                 <a:latin typeface="Eras Medium ITC" panose="020B0602030504020804" pitchFamily="34" charset="0"/>
               </a:rPr>
-              <a:t>Data confidentiality simply means keeping sensitive or personal information private, ensuring that only authorized individuals can access it. It's about protecting data from unauthorized disclosure or access. </a:t>
+              <a:t>Data confidentiality simply means keeping sensitive or personal information private, ensuring that only authorized individuals can access it. It's about protecting data from unauthorized disclosure or access.</a:t>
+            </a:r>
+          </a:p>
+          <a:p>
+            <a:r>
+              <a:rPr lang="en-US" sz="2700" dirty="0">
+                <a:solidFill>
+                  <a:schemeClr val="tx1">
+                    <a:lumMod val="85000"/>
+                    <a:lumOff val="15000"/>
+                  </a:schemeClr>
+                </a:solidFill>
+                <a:latin typeface="Eras Medium ITC" panose="020B0602030504020804" pitchFamily="34" charset="0"/>
+              </a:rPr>
+              <a:t>Ex-</a:t>
+            </a:r>
+            <a:r>
+              <a:rPr lang="en-US" sz="2700" dirty="0" err="1">
+                <a:solidFill>
+                  <a:schemeClr val="tx1">
+                    <a:lumMod val="85000"/>
+                    <a:lumOff val="15000"/>
+                  </a:schemeClr>
+                </a:solidFill>
+                <a:latin typeface="Eras Medium ITC" panose="020B0602030504020804" pitchFamily="34" charset="0"/>
+              </a:rPr>
+              <a:t>HTTPS</a:t>
+            </a:r>
+            <a:r>
+              <a:rPr lang="en-US" sz="2700" err="1">
+                <a:solidFill>
+                  <a:schemeClr val="tx1">
+                    <a:lumMod val="85000"/>
+                    <a:lumOff val="15000"/>
+                  </a:schemeClr>
+                </a:solidFill>
+                <a:latin typeface="Eras Medium ITC" panose="020B0602030504020804" pitchFamily="34" charset="0"/>
+              </a:rPr>
+              <a:t>,</a:t>
+            </a:r>
+            <a:r>
+              <a:rPr lang="en-US" sz="2700">
+                <a:solidFill>
+                  <a:schemeClr val="tx1">
+                    <a:lumMod val="85000"/>
+                    <a:lumOff val="15000"/>
+                  </a:schemeClr>
+                </a:solidFill>
+                <a:latin typeface="Eras Medium ITC" panose="020B0602030504020804" pitchFamily="34" charset="0"/>
+              </a:rPr>
+              <a:t>Whatsapp</a:t>
+            </a:r>
+            <a:r>
+              <a:rPr lang="en-US" sz="2700" b="0" i="0">
+                <a:solidFill>
+                  <a:schemeClr val="tx1">
+                    <a:lumMod val="85000"/>
+                    <a:lumOff val="15000"/>
+                  </a:schemeClr>
+                </a:solidFill>
+                <a:effectLst/>
+                <a:latin typeface="Eras Medium ITC" panose="020B0602030504020804" pitchFamily="34" charset="0"/>
+              </a:rPr>
+              <a:t> </a:t>
             </a:r>
             <a:endParaRPr lang="en-IN" sz="2700" dirty="0">
               <a:solidFill>
@@ -4656,7 +4731,7 @@
         <p:spPr>
           <a:xfrm>
             <a:off x="4917234" y="3498980"/>
-            <a:ext cx="6344816" cy="2585323"/>
+            <a:ext cx="6344816" cy="3000821"/>
           </a:xfrm>
           <a:prstGeom prst="rect">
             <a:avLst/>
@@ -4679,7 +4754,7 @@
                 </a:solidFill>
                 <a:latin typeface="Eras Medium ITC" panose="020B0602030504020804" pitchFamily="34" charset="0"/>
               </a:rPr>
-              <a:t>Data integrity ensures data is accurate, complete, and consistent throughout its lifecycle. It's about making sure data is reliable, preventing loss, or unauthorized changes. This means the data is free from errors</a:t>
+              <a:t>Data integrity ensures data is accurate, complete, and consistent throughout its lifecycle. It's about making sure data is reliable, preventing loss, or unauthorized changes. This means the data Encrypted like SHA-256,SSL Certificates.</a:t>
             </a:r>
             <a:endParaRPr lang="en-IN" sz="2700" dirty="0">
               <a:solidFill>

</xml_diff>